<commit_message>
updated notebook. Added a larger logistic model that improves isFraud==1 recall. Updates PPT
</commit_message>
<xml_diff>
--- a/Documents/Metis_Project3.pptx
+++ b/Documents/Metis_Project3.pptx
@@ -107,6 +107,11 @@
       </a:defRPr>
     </a:lvl9pPr>
   </p:defaultTextStyle>
+  <p:extLst>
+    <p:ext uri="{EFAFB233-063F-42B5-8137-9DF3F51BA10A}">
+      <p15:sldGuideLst xmlns:p15="http://schemas.microsoft.com/office/powerpoint/2012/main"/>
+    </p:ext>
+  </p:extLst>
 </p:presentation>
 </file>
 
@@ -257,7 +262,7 @@
           <a:p>
             <a:fld id="{43622750-2962-D449-B89A-D9515C725F02}" type="datetimeFigureOut">
               <a:rPr lang="en-US" smtClean="0"/>
-              <a:t>10/21/20</a:t>
+              <a:t>10/22/20</a:t>
             </a:fld>
             <a:endParaRPr lang="en-US"/>
           </a:p>
@@ -455,7 +460,7 @@
           <a:p>
             <a:fld id="{43622750-2962-D449-B89A-D9515C725F02}" type="datetimeFigureOut">
               <a:rPr lang="en-US" smtClean="0"/>
-              <a:t>10/21/20</a:t>
+              <a:t>10/22/20</a:t>
             </a:fld>
             <a:endParaRPr lang="en-US"/>
           </a:p>
@@ -663,7 +668,7 @@
           <a:p>
             <a:fld id="{43622750-2962-D449-B89A-D9515C725F02}" type="datetimeFigureOut">
               <a:rPr lang="en-US" smtClean="0"/>
-              <a:t>10/21/20</a:t>
+              <a:t>10/22/20</a:t>
             </a:fld>
             <a:endParaRPr lang="en-US"/>
           </a:p>
@@ -861,7 +866,7 @@
           <a:p>
             <a:fld id="{43622750-2962-D449-B89A-D9515C725F02}" type="datetimeFigureOut">
               <a:rPr lang="en-US" smtClean="0"/>
-              <a:t>10/21/20</a:t>
+              <a:t>10/22/20</a:t>
             </a:fld>
             <a:endParaRPr lang="en-US"/>
           </a:p>
@@ -1136,7 +1141,7 @@
           <a:p>
             <a:fld id="{43622750-2962-D449-B89A-D9515C725F02}" type="datetimeFigureOut">
               <a:rPr lang="en-US" smtClean="0"/>
-              <a:t>10/21/20</a:t>
+              <a:t>10/22/20</a:t>
             </a:fld>
             <a:endParaRPr lang="en-US"/>
           </a:p>
@@ -1401,7 +1406,7 @@
           <a:p>
             <a:fld id="{43622750-2962-D449-B89A-D9515C725F02}" type="datetimeFigureOut">
               <a:rPr lang="en-US" smtClean="0"/>
-              <a:t>10/21/20</a:t>
+              <a:t>10/22/20</a:t>
             </a:fld>
             <a:endParaRPr lang="en-US"/>
           </a:p>
@@ -1813,7 +1818,7 @@
           <a:p>
             <a:fld id="{43622750-2962-D449-B89A-D9515C725F02}" type="datetimeFigureOut">
               <a:rPr lang="en-US" smtClean="0"/>
-              <a:t>10/21/20</a:t>
+              <a:t>10/22/20</a:t>
             </a:fld>
             <a:endParaRPr lang="en-US"/>
           </a:p>
@@ -1954,7 +1959,7 @@
           <a:p>
             <a:fld id="{43622750-2962-D449-B89A-D9515C725F02}" type="datetimeFigureOut">
               <a:rPr lang="en-US" smtClean="0"/>
-              <a:t>10/21/20</a:t>
+              <a:t>10/22/20</a:t>
             </a:fld>
             <a:endParaRPr lang="en-US"/>
           </a:p>
@@ -2067,7 +2072,7 @@
           <a:p>
             <a:fld id="{43622750-2962-D449-B89A-D9515C725F02}" type="datetimeFigureOut">
               <a:rPr lang="en-US" smtClean="0"/>
-              <a:t>10/21/20</a:t>
+              <a:t>10/22/20</a:t>
             </a:fld>
             <a:endParaRPr lang="en-US"/>
           </a:p>
@@ -2378,7 +2383,7 @@
           <a:p>
             <a:fld id="{43622750-2962-D449-B89A-D9515C725F02}" type="datetimeFigureOut">
               <a:rPr lang="en-US" smtClean="0"/>
-              <a:t>10/21/20</a:t>
+              <a:t>10/22/20</a:t>
             </a:fld>
             <a:endParaRPr lang="en-US"/>
           </a:p>
@@ -2666,7 +2671,7 @@
           <a:p>
             <a:fld id="{43622750-2962-D449-B89A-D9515C725F02}" type="datetimeFigureOut">
               <a:rPr lang="en-US" smtClean="0"/>
-              <a:t>10/21/20</a:t>
+              <a:t>10/22/20</a:t>
             </a:fld>
             <a:endParaRPr lang="en-US"/>
           </a:p>
@@ -2907,7 +2912,7 @@
           <a:p>
             <a:fld id="{43622750-2962-D449-B89A-D9515C725F02}" type="datetimeFigureOut">
               <a:rPr lang="en-US" smtClean="0"/>
-              <a:t>10/21/20</a:t>
+              <a:t>10/22/20</a:t>
             </a:fld>
             <a:endParaRPr lang="en-US"/>
           </a:p>
@@ -3520,8 +3525,8 @@
         </p:nvSpPr>
         <p:spPr>
           <a:xfrm>
-            <a:off x="477981" y="1122363"/>
-            <a:ext cx="4023360" cy="3204134"/>
+            <a:off x="477980" y="1122363"/>
+            <a:ext cx="4651823" cy="3204134"/>
           </a:xfrm>
         </p:spPr>
         <p:txBody>
@@ -3532,7 +3537,7 @@
           <a:p>
             <a:r>
               <a:rPr lang="en-US" sz="4100" dirty="0"/>
-              <a:t>Automatically Detecting Financial Fraud In Mobile A Mobile Payment System</a:t>
+              <a:t>Automatically Detecting Financial Fraud In A Mobile Payment System</a:t>
             </a:r>
           </a:p>
         </p:txBody>

</xml_diff>